<commit_message>
Final version of slided
</commit_message>
<xml_diff>
--- a/prezentace.pptx
+++ b/prezentace.pptx
@@ -5,10 +5,10 @@
     <p:sldMasterId id="2147483649" r:id="rId1"/>
   </p:sldMasterIdLst>
   <p:notesMasterIdLst>
-    <p:notesMasterId r:id="rId13"/>
+    <p:notesMasterId r:id="rId14"/>
   </p:notesMasterIdLst>
   <p:handoutMasterIdLst>
-    <p:handoutMasterId r:id="rId14"/>
+    <p:handoutMasterId r:id="rId15"/>
   </p:handoutMasterIdLst>
   <p:sldIdLst>
     <p:sldId id="256" r:id="rId2"/>
@@ -21,7 +21,8 @@
     <p:sldId id="270" r:id="rId9"/>
     <p:sldId id="264" r:id="rId10"/>
     <p:sldId id="269" r:id="rId11"/>
-    <p:sldId id="266" r:id="rId12"/>
+    <p:sldId id="271" r:id="rId12"/>
+    <p:sldId id="266" r:id="rId13"/>
   </p:sldIdLst>
   <p:sldSz cx="12192000" cy="6858000"/>
   <p:notesSz cx="6858000" cy="9144000"/>
@@ -1084,6 +1085,91 @@
               <a:rPr lang="cs-CZ" altLang="cs-CZ" smtClean="0"/>
               <a:pPr/>
               <a:t>11</a:t>
+            </a:fld>
+            <a:endParaRPr lang="cs-CZ" altLang="cs-CZ"/>
+          </a:p>
+        </p:txBody>
+      </p:sp>
+    </p:spTree>
+    <p:extLst>
+      <p:ext uri="{BB962C8B-B14F-4D97-AF65-F5344CB8AC3E}">
+        <p14:creationId xmlns:p14="http://schemas.microsoft.com/office/powerpoint/2010/main" val="1388679344"/>
+      </p:ext>
+    </p:extLst>
+  </p:cSld>
+  <p:clrMapOvr>
+    <a:masterClrMapping/>
+  </p:clrMapOvr>
+</p:notes>
+</file>
+
+<file path=ppt/notesSlides/notesSlide11.xml><?xml version="1.0" encoding="utf-8"?>
+<p:notes xmlns:a="http://schemas.openxmlformats.org/drawingml/2006/main" xmlns:r="http://schemas.openxmlformats.org/officeDocument/2006/relationships" xmlns:p="http://schemas.openxmlformats.org/presentationml/2006/main">
+  <p:cSld>
+    <p:spTree>
+      <p:nvGrpSpPr>
+        <p:cNvPr id="1" name=""/>
+        <p:cNvGrpSpPr/>
+        <p:nvPr/>
+      </p:nvGrpSpPr>
+      <p:grpSpPr>
+        <a:xfrm>
+          <a:off x="0" y="0"/>
+          <a:ext cx="0" cy="0"/>
+          <a:chOff x="0" y="0"/>
+          <a:chExt cx="0" cy="0"/>
+        </a:xfrm>
+      </p:grpSpPr>
+      <p:sp>
+        <p:nvSpPr>
+          <p:cNvPr id="2" name="Zástupný symbol pro obrázek snímku 1"/>
+          <p:cNvSpPr>
+            <a:spLocks noGrp="1" noRot="1" noChangeAspect="1"/>
+          </p:cNvSpPr>
+          <p:nvPr>
+            <p:ph type="sldImg"/>
+          </p:nvPr>
+        </p:nvSpPr>
+        <p:spPr/>
+      </p:sp>
+      <p:sp>
+        <p:nvSpPr>
+          <p:cNvPr id="3" name="Zástupný symbol pro poznámky 2"/>
+          <p:cNvSpPr>
+            <a:spLocks noGrp="1"/>
+          </p:cNvSpPr>
+          <p:nvPr>
+            <p:ph type="body" idx="1"/>
+          </p:nvPr>
+        </p:nvSpPr>
+        <p:spPr/>
+        <p:txBody>
+          <a:bodyPr/>
+          <a:lstStyle/>
+          <a:p>
+            <a:endParaRPr lang="cs-CZ"/>
+          </a:p>
+        </p:txBody>
+      </p:sp>
+      <p:sp>
+        <p:nvSpPr>
+          <p:cNvPr id="4" name="Zástupný symbol pro číslo snímku 3"/>
+          <p:cNvSpPr>
+            <a:spLocks noGrp="1"/>
+          </p:cNvSpPr>
+          <p:nvPr>
+            <p:ph type="sldNum" sz="quarter" idx="10"/>
+          </p:nvPr>
+        </p:nvSpPr>
+        <p:spPr/>
+        <p:txBody>
+          <a:bodyPr/>
+          <a:lstStyle/>
+          <a:p>
+            <a:fld id="{511FA9D6-BDC7-4110-B055-029A3A5CC98B}" type="slidenum">
+              <a:rPr lang="cs-CZ" altLang="cs-CZ" smtClean="0"/>
+              <a:pPr/>
+              <a:t>12</a:t>
             </a:fld>
             <a:endParaRPr lang="cs-CZ" altLang="cs-CZ"/>
           </a:p>
@@ -4627,7 +4713,7 @@
             </a:pPr>
             <a:r>
               <a:rPr lang="cs-CZ" dirty="0"/>
-              <a:t>1/x</a:t>
+              <a:t>9/11</a:t>
             </a:r>
           </a:p>
         </p:txBody>
@@ -5359,7 +5445,7 @@
           <a:p>
             <a:r>
               <a:rPr lang="cs-CZ" dirty="0"/>
-              <a:t>Děkuji za pozornost!</a:t>
+              <a:t>Univerzální filtr pro Gauss a S&amp;P</a:t>
             </a:r>
           </a:p>
         </p:txBody>
@@ -5395,7 +5481,717 @@
             </a:pPr>
             <a:r>
               <a:rPr lang="cs-CZ" dirty="0"/>
-              <a:t>1/x</a:t>
+              <a:t>10/11</a:t>
+            </a:r>
+          </a:p>
+        </p:txBody>
+      </p:sp>
+      <p:pic>
+        <p:nvPicPr>
+          <p:cNvPr id="4" name="Obrázek 3" descr="Obsah obrázku text, snímek obrazovky, řada/pruh, diagram&#10;&#10;Popis byl vytvořen automaticky">
+            <a:extLst>
+              <a:ext uri="{FF2B5EF4-FFF2-40B4-BE49-F238E27FC236}">
+                <a16:creationId xmlns:a16="http://schemas.microsoft.com/office/drawing/2014/main" id="{EDACA79C-A651-7FEE-B16A-8D768CD8D0D8}"/>
+              </a:ext>
+            </a:extLst>
+          </p:cNvPr>
+          <p:cNvPicPr>
+            <a:picLocks noChangeAspect="1"/>
+          </p:cNvPicPr>
+          <p:nvPr/>
+        </p:nvPicPr>
+        <p:blipFill>
+          <a:blip r:embed="rId3">
+            <a:extLst>
+              <a:ext uri="{28A0092B-C50C-407E-A947-70E740481C1C}">
+                <a14:useLocalDpi xmlns:a14="http://schemas.microsoft.com/office/drawing/2010/main" val="0"/>
+              </a:ext>
+            </a:extLst>
+          </a:blip>
+          <a:stretch>
+            <a:fillRect/>
+          </a:stretch>
+        </p:blipFill>
+        <p:spPr>
+          <a:xfrm>
+            <a:off x="304217" y="620713"/>
+            <a:ext cx="4860401" cy="3106930"/>
+          </a:xfrm>
+          <a:prstGeom prst="rect">
+            <a:avLst/>
+          </a:prstGeom>
+        </p:spPr>
+      </p:pic>
+      <p:pic>
+        <p:nvPicPr>
+          <p:cNvPr id="7" name="Obrázek 6" descr="Obsah obrázku text, diagram, snímek obrazovky, Obdélník&#10;&#10;Popis byl vytvořen automaticky">
+            <a:extLst>
+              <a:ext uri="{FF2B5EF4-FFF2-40B4-BE49-F238E27FC236}">
+                <a16:creationId xmlns:a16="http://schemas.microsoft.com/office/drawing/2014/main" id="{2A44794E-6DB0-3864-CC60-D6B65C4845F6}"/>
+              </a:ext>
+            </a:extLst>
+          </p:cNvPr>
+          <p:cNvPicPr>
+            <a:picLocks noChangeAspect="1"/>
+          </p:cNvPicPr>
+          <p:nvPr/>
+        </p:nvPicPr>
+        <p:blipFill>
+          <a:blip r:embed="rId4">
+            <a:extLst>
+              <a:ext uri="{28A0092B-C50C-407E-A947-70E740481C1C}">
+                <a14:useLocalDpi xmlns:a14="http://schemas.microsoft.com/office/drawing/2010/main" val="0"/>
+              </a:ext>
+            </a:extLst>
+          </a:blip>
+          <a:stretch>
+            <a:fillRect/>
+          </a:stretch>
+        </p:blipFill>
+        <p:spPr>
+          <a:xfrm>
+            <a:off x="551384" y="3727643"/>
+            <a:ext cx="3580626" cy="2727858"/>
+          </a:xfrm>
+          <a:prstGeom prst="rect">
+            <a:avLst/>
+          </a:prstGeom>
+        </p:spPr>
+      </p:pic>
+      <p:pic>
+        <p:nvPicPr>
+          <p:cNvPr id="9" name="Obrázek 8" descr="Obsah obrázku černobílá, venku, obloha, budova&#10;&#10;Popis byl vytvořen automaticky">
+            <a:extLst>
+              <a:ext uri="{FF2B5EF4-FFF2-40B4-BE49-F238E27FC236}">
+                <a16:creationId xmlns:a16="http://schemas.microsoft.com/office/drawing/2014/main" id="{94939CA2-86AF-7220-5C57-31A788BC1D49}"/>
+              </a:ext>
+            </a:extLst>
+          </p:cNvPr>
+          <p:cNvPicPr>
+            <a:picLocks noChangeAspect="1"/>
+          </p:cNvPicPr>
+          <p:nvPr/>
+        </p:nvPicPr>
+        <p:blipFill>
+          <a:blip r:embed="rId5">
+            <a:extLst>
+              <a:ext uri="{28A0092B-C50C-407E-A947-70E740481C1C}">
+                <a14:useLocalDpi xmlns:a14="http://schemas.microsoft.com/office/drawing/2010/main" val="0"/>
+              </a:ext>
+            </a:extLst>
+          </a:blip>
+          <a:stretch>
+            <a:fillRect/>
+          </a:stretch>
+        </p:blipFill>
+        <p:spPr>
+          <a:xfrm>
+            <a:off x="5455355" y="1486972"/>
+            <a:ext cx="1608130" cy="1608130"/>
+          </a:xfrm>
+          <a:prstGeom prst="rect">
+            <a:avLst/>
+          </a:prstGeom>
+        </p:spPr>
+      </p:pic>
+      <p:pic>
+        <p:nvPicPr>
+          <p:cNvPr id="12" name="Obrázek 11" descr="Obsah obrázku bílé, design&#10;&#10;Popis byl vytvořen automaticky">
+            <a:extLst>
+              <a:ext uri="{FF2B5EF4-FFF2-40B4-BE49-F238E27FC236}">
+                <a16:creationId xmlns:a16="http://schemas.microsoft.com/office/drawing/2014/main" id="{B5D0F0FA-0170-B268-E140-EC2BD96A7C26}"/>
+              </a:ext>
+            </a:extLst>
+          </p:cNvPr>
+          <p:cNvPicPr>
+            <a:picLocks noChangeAspect="1"/>
+          </p:cNvPicPr>
+          <p:nvPr/>
+        </p:nvPicPr>
+        <p:blipFill>
+          <a:blip r:embed="rId6">
+            <a:extLst>
+              <a:ext uri="{28A0092B-C50C-407E-A947-70E740481C1C}">
+                <a14:useLocalDpi xmlns:a14="http://schemas.microsoft.com/office/drawing/2010/main" val="0"/>
+              </a:ext>
+            </a:extLst>
+          </a:blip>
+          <a:stretch>
+            <a:fillRect/>
+          </a:stretch>
+        </p:blipFill>
+        <p:spPr>
+          <a:xfrm>
+            <a:off x="7063485" y="1480290"/>
+            <a:ext cx="1608130" cy="1608130"/>
+          </a:xfrm>
+          <a:prstGeom prst="rect">
+            <a:avLst/>
+          </a:prstGeom>
+          <a:ln>
+            <a:solidFill>
+              <a:schemeClr val="tx1"/>
+            </a:solidFill>
+          </a:ln>
+        </p:spPr>
+      </p:pic>
+      <p:pic>
+        <p:nvPicPr>
+          <p:cNvPr id="14" name="Obrázek 13" descr="Obsah obrázku černobílá, venku, obloha, budova&#10;&#10;Popis byl vytvořen automaticky">
+            <a:extLst>
+              <a:ext uri="{FF2B5EF4-FFF2-40B4-BE49-F238E27FC236}">
+                <a16:creationId xmlns:a16="http://schemas.microsoft.com/office/drawing/2014/main" id="{16E82FA2-8647-FC7D-8B69-8CF80C084C04}"/>
+              </a:ext>
+            </a:extLst>
+          </p:cNvPr>
+          <p:cNvPicPr>
+            <a:picLocks noChangeAspect="1"/>
+          </p:cNvPicPr>
+          <p:nvPr/>
+        </p:nvPicPr>
+        <p:blipFill>
+          <a:blip r:embed="rId7">
+            <a:extLst>
+              <a:ext uri="{28A0092B-C50C-407E-A947-70E740481C1C}">
+                <a14:useLocalDpi xmlns:a14="http://schemas.microsoft.com/office/drawing/2010/main" val="0"/>
+              </a:ext>
+            </a:extLst>
+          </a:blip>
+          <a:stretch>
+            <a:fillRect/>
+          </a:stretch>
+        </p:blipFill>
+        <p:spPr>
+          <a:xfrm>
+            <a:off x="8803654" y="1486972"/>
+            <a:ext cx="1608130" cy="1608130"/>
+          </a:xfrm>
+          <a:prstGeom prst="rect">
+            <a:avLst/>
+          </a:prstGeom>
+        </p:spPr>
+      </p:pic>
+      <p:pic>
+        <p:nvPicPr>
+          <p:cNvPr id="18" name="Obrázek 17" descr="Obsah obrázku bílé, design&#10;&#10;Popis byl vytvořen automaticky">
+            <a:extLst>
+              <a:ext uri="{FF2B5EF4-FFF2-40B4-BE49-F238E27FC236}">
+                <a16:creationId xmlns:a16="http://schemas.microsoft.com/office/drawing/2014/main" id="{B9434812-E33A-386C-6572-5959C4ED6884}"/>
+              </a:ext>
+            </a:extLst>
+          </p:cNvPr>
+          <p:cNvPicPr>
+            <a:picLocks noChangeAspect="1"/>
+          </p:cNvPicPr>
+          <p:nvPr/>
+        </p:nvPicPr>
+        <p:blipFill>
+          <a:blip r:embed="rId6">
+            <a:extLst>
+              <a:ext uri="{28A0092B-C50C-407E-A947-70E740481C1C}">
+                <a14:useLocalDpi xmlns:a14="http://schemas.microsoft.com/office/drawing/2010/main" val="0"/>
+              </a:ext>
+            </a:extLst>
+          </a:blip>
+          <a:stretch>
+            <a:fillRect/>
+          </a:stretch>
+        </p:blipFill>
+        <p:spPr>
+          <a:xfrm>
+            <a:off x="10411784" y="1480290"/>
+            <a:ext cx="1608130" cy="1608130"/>
+          </a:xfrm>
+          <a:prstGeom prst="rect">
+            <a:avLst/>
+          </a:prstGeom>
+          <a:ln>
+            <a:solidFill>
+              <a:schemeClr val="tx1"/>
+            </a:solidFill>
+          </a:ln>
+        </p:spPr>
+      </p:pic>
+      <p:pic>
+        <p:nvPicPr>
+          <p:cNvPr id="23" name="Obrázek 22" descr="Obsah obrázku černobílá, venku, budova, obloha&#10;&#10;Popis byl vytvořen automaticky">
+            <a:extLst>
+              <a:ext uri="{FF2B5EF4-FFF2-40B4-BE49-F238E27FC236}">
+                <a16:creationId xmlns:a16="http://schemas.microsoft.com/office/drawing/2014/main" id="{B9D86FD9-8074-AC8C-ED0C-52B8F059F5CD}"/>
+              </a:ext>
+            </a:extLst>
+          </p:cNvPr>
+          <p:cNvPicPr>
+            <a:picLocks noChangeAspect="1"/>
+          </p:cNvPicPr>
+          <p:nvPr/>
+        </p:nvPicPr>
+        <p:blipFill>
+          <a:blip r:embed="rId8">
+            <a:extLst>
+              <a:ext uri="{28A0092B-C50C-407E-A947-70E740481C1C}">
+                <a14:useLocalDpi xmlns:a14="http://schemas.microsoft.com/office/drawing/2010/main" val="0"/>
+              </a:ext>
+            </a:extLst>
+          </a:blip>
+          <a:stretch>
+            <a:fillRect/>
+          </a:stretch>
+        </p:blipFill>
+        <p:spPr>
+          <a:xfrm>
+            <a:off x="8822168" y="3992959"/>
+            <a:ext cx="1608130" cy="1608130"/>
+          </a:xfrm>
+          <a:prstGeom prst="rect">
+            <a:avLst/>
+          </a:prstGeom>
+        </p:spPr>
+      </p:pic>
+      <p:pic>
+        <p:nvPicPr>
+          <p:cNvPr id="25" name="Obrázek 24" descr="Obsah obrázku bílé, design&#10;&#10;Popis byl vytvořen automaticky">
+            <a:extLst>
+              <a:ext uri="{FF2B5EF4-FFF2-40B4-BE49-F238E27FC236}">
+                <a16:creationId xmlns:a16="http://schemas.microsoft.com/office/drawing/2014/main" id="{C4247AC2-D99C-0BC7-038F-4D826DBE673B}"/>
+              </a:ext>
+            </a:extLst>
+          </p:cNvPr>
+          <p:cNvPicPr>
+            <a:picLocks noChangeAspect="1"/>
+          </p:cNvPicPr>
+          <p:nvPr/>
+        </p:nvPicPr>
+        <p:blipFill>
+          <a:blip r:embed="rId6">
+            <a:extLst>
+              <a:ext uri="{28A0092B-C50C-407E-A947-70E740481C1C}">
+                <a14:useLocalDpi xmlns:a14="http://schemas.microsoft.com/office/drawing/2010/main" val="0"/>
+              </a:ext>
+            </a:extLst>
+          </a:blip>
+          <a:stretch>
+            <a:fillRect/>
+          </a:stretch>
+        </p:blipFill>
+        <p:spPr>
+          <a:xfrm>
+            <a:off x="10430298" y="3998664"/>
+            <a:ext cx="1608130" cy="1608130"/>
+          </a:xfrm>
+          <a:prstGeom prst="rect">
+            <a:avLst/>
+          </a:prstGeom>
+          <a:ln>
+            <a:solidFill>
+              <a:schemeClr val="tx1"/>
+            </a:solidFill>
+          </a:ln>
+        </p:spPr>
+      </p:pic>
+      <p:pic>
+        <p:nvPicPr>
+          <p:cNvPr id="34" name="Obrázek 33" descr="Obsah obrázku venku, černobílá, obloha, budova&#10;&#10;Popis byl vytvořen automaticky">
+            <a:extLst>
+              <a:ext uri="{FF2B5EF4-FFF2-40B4-BE49-F238E27FC236}">
+                <a16:creationId xmlns:a16="http://schemas.microsoft.com/office/drawing/2014/main" id="{4B037EC0-891F-45FF-0C39-80A84F6C5CF5}"/>
+              </a:ext>
+            </a:extLst>
+          </p:cNvPr>
+          <p:cNvPicPr>
+            <a:picLocks noChangeAspect="1"/>
+          </p:cNvPicPr>
+          <p:nvPr/>
+        </p:nvPicPr>
+        <p:blipFill>
+          <a:blip r:embed="rId9">
+            <a:extLst>
+              <a:ext uri="{28A0092B-C50C-407E-A947-70E740481C1C}">
+                <a14:useLocalDpi xmlns:a14="http://schemas.microsoft.com/office/drawing/2010/main" val="0"/>
+              </a:ext>
+            </a:extLst>
+          </a:blip>
+          <a:stretch>
+            <a:fillRect/>
+          </a:stretch>
+        </p:blipFill>
+        <p:spPr>
+          <a:xfrm>
+            <a:off x="5475099" y="4001025"/>
+            <a:ext cx="1608130" cy="1608130"/>
+          </a:xfrm>
+          <a:prstGeom prst="rect">
+            <a:avLst/>
+          </a:prstGeom>
+        </p:spPr>
+      </p:pic>
+      <p:pic>
+        <p:nvPicPr>
+          <p:cNvPr id="36" name="Obrázek 35" descr="Obsah obrázku umění, černobílá, kresba, skica&#10;&#10;Popis byl vytvořen automaticky">
+            <a:extLst>
+              <a:ext uri="{FF2B5EF4-FFF2-40B4-BE49-F238E27FC236}">
+                <a16:creationId xmlns:a16="http://schemas.microsoft.com/office/drawing/2014/main" id="{40CD0196-C14A-D9A0-6DB8-F4B0389A83D1}"/>
+              </a:ext>
+            </a:extLst>
+          </p:cNvPr>
+          <p:cNvPicPr>
+            <a:picLocks noChangeAspect="1"/>
+          </p:cNvPicPr>
+          <p:nvPr/>
+        </p:nvPicPr>
+        <p:blipFill>
+          <a:blip r:embed="rId10">
+            <a:extLst>
+              <a:ext uri="{28A0092B-C50C-407E-A947-70E740481C1C}">
+                <a14:useLocalDpi xmlns:a14="http://schemas.microsoft.com/office/drawing/2010/main" val="0"/>
+              </a:ext>
+            </a:extLst>
+          </a:blip>
+          <a:stretch>
+            <a:fillRect/>
+          </a:stretch>
+        </p:blipFill>
+        <p:spPr>
+          <a:xfrm>
+            <a:off x="7073590" y="4001025"/>
+            <a:ext cx="1608130" cy="1608130"/>
+          </a:xfrm>
+          <a:prstGeom prst="rect">
+            <a:avLst/>
+          </a:prstGeom>
+        </p:spPr>
+      </p:pic>
+      <p:sp>
+        <p:nvSpPr>
+          <p:cNvPr id="37" name="TextovéPole 36">
+            <a:extLst>
+              <a:ext uri="{FF2B5EF4-FFF2-40B4-BE49-F238E27FC236}">
+                <a16:creationId xmlns:a16="http://schemas.microsoft.com/office/drawing/2014/main" id="{9F2B40C1-607F-9544-FEC0-E7583DC91620}"/>
+              </a:ext>
+            </a:extLst>
+          </p:cNvPr>
+          <p:cNvSpPr txBox="1"/>
+          <p:nvPr/>
+        </p:nvSpPr>
+        <p:spPr>
+          <a:xfrm>
+            <a:off x="5316076" y="702341"/>
+            <a:ext cx="2328714" cy="492443"/>
+          </a:xfrm>
+          <a:prstGeom prst="rect">
+            <a:avLst/>
+          </a:prstGeom>
+          <a:noFill/>
+        </p:spPr>
+        <p:txBody>
+          <a:bodyPr wrap="none" rtlCol="0">
+            <a:spAutoFit/>
+          </a:bodyPr>
+          <a:lstStyle/>
+          <a:p>
+            <a:pPr algn="l">
+              <a:buNone/>
+            </a:pPr>
+            <a:r>
+              <a:rPr lang="cs-CZ" sz="2600" b="0" dirty="0">
+                <a:solidFill>
+                  <a:schemeClr val="tx1"/>
+                </a:solidFill>
+                <a:latin typeface="Calibri" panose="020F0502020204030204" pitchFamily="34" charset="0"/>
+                <a:ea typeface="Calibri" panose="020F0502020204030204" pitchFamily="34" charset="0"/>
+                <a:cs typeface="Calibri" panose="020F0502020204030204" pitchFamily="34" charset="0"/>
+              </a:rPr>
+              <a:t>Univerzální filtr:</a:t>
+            </a:r>
+          </a:p>
+        </p:txBody>
+      </p:sp>
+      <p:sp>
+        <p:nvSpPr>
+          <p:cNvPr id="38" name="TextovéPole 37">
+            <a:extLst>
+              <a:ext uri="{FF2B5EF4-FFF2-40B4-BE49-F238E27FC236}">
+                <a16:creationId xmlns:a16="http://schemas.microsoft.com/office/drawing/2014/main" id="{3AFCAE27-0DF7-1B7D-0C78-88A8AD43E6A8}"/>
+              </a:ext>
+            </a:extLst>
+          </p:cNvPr>
+          <p:cNvSpPr txBox="1"/>
+          <p:nvPr/>
+        </p:nvSpPr>
+        <p:spPr>
+          <a:xfrm>
+            <a:off x="6800635" y="1135270"/>
+            <a:ext cx="566181" cy="369332"/>
+          </a:xfrm>
+          <a:prstGeom prst="rect">
+            <a:avLst/>
+          </a:prstGeom>
+          <a:noFill/>
+        </p:spPr>
+        <p:txBody>
+          <a:bodyPr wrap="none" rtlCol="0">
+            <a:spAutoFit/>
+          </a:bodyPr>
+          <a:lstStyle/>
+          <a:p>
+            <a:pPr algn="l">
+              <a:buNone/>
+            </a:pPr>
+            <a:r>
+              <a:rPr lang="cs-CZ" sz="1800" b="0" dirty="0">
+                <a:solidFill>
+                  <a:schemeClr val="tx1"/>
+                </a:solidFill>
+                <a:latin typeface="Calibri" panose="020F0502020204030204" pitchFamily="34" charset="0"/>
+                <a:ea typeface="Calibri" panose="020F0502020204030204" pitchFamily="34" charset="0"/>
+                <a:cs typeface="Calibri" panose="020F0502020204030204" pitchFamily="34" charset="0"/>
+              </a:rPr>
+              <a:t>S&amp;P</a:t>
+            </a:r>
+          </a:p>
+        </p:txBody>
+      </p:sp>
+      <p:sp>
+        <p:nvSpPr>
+          <p:cNvPr id="40" name="TextovéPole 39">
+            <a:extLst>
+              <a:ext uri="{FF2B5EF4-FFF2-40B4-BE49-F238E27FC236}">
+                <a16:creationId xmlns:a16="http://schemas.microsoft.com/office/drawing/2014/main" id="{E7FE0023-E48A-7E4B-516F-29EF5827922B}"/>
+              </a:ext>
+            </a:extLst>
+          </p:cNvPr>
+          <p:cNvSpPr txBox="1"/>
+          <p:nvPr/>
+        </p:nvSpPr>
+        <p:spPr>
+          <a:xfrm>
+            <a:off x="10017640" y="1122560"/>
+            <a:ext cx="679994" cy="338554"/>
+          </a:xfrm>
+          <a:prstGeom prst="rect">
+            <a:avLst/>
+          </a:prstGeom>
+          <a:noFill/>
+        </p:spPr>
+        <p:txBody>
+          <a:bodyPr wrap="none" rtlCol="0">
+            <a:spAutoFit/>
+          </a:bodyPr>
+          <a:lstStyle/>
+          <a:p>
+            <a:pPr algn="l">
+              <a:buNone/>
+            </a:pPr>
+            <a:r>
+              <a:rPr lang="cs-CZ" sz="1600" b="0" dirty="0">
+                <a:solidFill>
+                  <a:schemeClr val="tx1"/>
+                </a:solidFill>
+                <a:latin typeface="Calibri" panose="020F0502020204030204" pitchFamily="34" charset="0"/>
+                <a:ea typeface="Calibri" panose="020F0502020204030204" pitchFamily="34" charset="0"/>
+                <a:cs typeface="Calibri" panose="020F0502020204030204" pitchFamily="34" charset="0"/>
+              </a:rPr>
+              <a:t>Gauss</a:t>
+            </a:r>
+          </a:p>
+        </p:txBody>
+      </p:sp>
+      <p:sp>
+        <p:nvSpPr>
+          <p:cNvPr id="48" name="TextovéPole 47">
+            <a:extLst>
+              <a:ext uri="{FF2B5EF4-FFF2-40B4-BE49-F238E27FC236}">
+                <a16:creationId xmlns:a16="http://schemas.microsoft.com/office/drawing/2014/main" id="{C18DD513-E8E6-5F49-58B5-95EB3C2FAB08}"/>
+              </a:ext>
+            </a:extLst>
+          </p:cNvPr>
+          <p:cNvSpPr txBox="1"/>
+          <p:nvPr/>
+        </p:nvSpPr>
+        <p:spPr>
+          <a:xfrm>
+            <a:off x="5319269" y="3429338"/>
+            <a:ext cx="2569999" cy="492443"/>
+          </a:xfrm>
+          <a:prstGeom prst="rect">
+            <a:avLst/>
+          </a:prstGeom>
+          <a:noFill/>
+        </p:spPr>
+        <p:txBody>
+          <a:bodyPr wrap="none" rtlCol="0">
+            <a:spAutoFit/>
+          </a:bodyPr>
+          <a:lstStyle/>
+          <a:p>
+            <a:pPr algn="l">
+              <a:buNone/>
+            </a:pPr>
+            <a:r>
+              <a:rPr lang="cs-CZ" sz="2600" b="0" dirty="0">
+                <a:solidFill>
+                  <a:schemeClr val="tx1"/>
+                </a:solidFill>
+                <a:latin typeface="Calibri" panose="020F0502020204030204" pitchFamily="34" charset="0"/>
+                <a:ea typeface="Calibri" panose="020F0502020204030204" pitchFamily="34" charset="0"/>
+                <a:cs typeface="Calibri" panose="020F0502020204030204" pitchFamily="34" charset="0"/>
+              </a:rPr>
+              <a:t>Dedikované filtry:</a:t>
+            </a:r>
+          </a:p>
+        </p:txBody>
+      </p:sp>
+      <p:sp>
+        <p:nvSpPr>
+          <p:cNvPr id="50" name="TextovéPole 49">
+            <a:extLst>
+              <a:ext uri="{FF2B5EF4-FFF2-40B4-BE49-F238E27FC236}">
+                <a16:creationId xmlns:a16="http://schemas.microsoft.com/office/drawing/2014/main" id="{464B7E41-742A-9EE0-4CB0-B1438735DDCF}"/>
+              </a:ext>
+            </a:extLst>
+          </p:cNvPr>
+          <p:cNvSpPr txBox="1"/>
+          <p:nvPr/>
+        </p:nvSpPr>
+        <p:spPr>
+          <a:xfrm>
+            <a:off x="8576989" y="5879199"/>
+            <a:ext cx="3561296" cy="492443"/>
+          </a:xfrm>
+          <a:prstGeom prst="rect">
+            <a:avLst/>
+          </a:prstGeom>
+          <a:noFill/>
+        </p:spPr>
+        <p:txBody>
+          <a:bodyPr wrap="none" rtlCol="0">
+            <a:spAutoFit/>
+          </a:bodyPr>
+          <a:lstStyle/>
+          <a:p>
+            <a:pPr algn="l">
+              <a:buNone/>
+            </a:pPr>
+            <a:r>
+              <a:rPr lang="cs-CZ" sz="2600" b="0" dirty="0">
+                <a:solidFill>
+                  <a:schemeClr val="tx1"/>
+                </a:solidFill>
+                <a:latin typeface="Calibri" panose="020F0502020204030204" pitchFamily="34" charset="0"/>
+                <a:ea typeface="Calibri" panose="020F0502020204030204" pitchFamily="34" charset="0"/>
+                <a:cs typeface="Calibri" panose="020F0502020204030204" pitchFamily="34" charset="0"/>
+              </a:rPr>
+              <a:t>(Trénovací obrázek: </a:t>
+            </a:r>
+            <a:r>
+              <a:rPr lang="cs-CZ" sz="2600" b="0" i="1" dirty="0" err="1">
+                <a:solidFill>
+                  <a:schemeClr val="tx1"/>
+                </a:solidFill>
+                <a:latin typeface="Calibri" panose="020F0502020204030204" pitchFamily="34" charset="0"/>
+                <a:ea typeface="Calibri" panose="020F0502020204030204" pitchFamily="34" charset="0"/>
+                <a:cs typeface="Calibri" panose="020F0502020204030204" pitchFamily="34" charset="0"/>
+              </a:rPr>
+              <a:t>lena</a:t>
+            </a:r>
+            <a:r>
+              <a:rPr lang="cs-CZ" sz="2600" b="0" i="1" dirty="0">
+                <a:solidFill>
+                  <a:schemeClr val="tx1"/>
+                </a:solidFill>
+                <a:latin typeface="Calibri" panose="020F0502020204030204" pitchFamily="34" charset="0"/>
+                <a:ea typeface="Calibri" panose="020F0502020204030204" pitchFamily="34" charset="0"/>
+                <a:cs typeface="Calibri" panose="020F0502020204030204" pitchFamily="34" charset="0"/>
+              </a:rPr>
+              <a:t>)</a:t>
+            </a:r>
+          </a:p>
+        </p:txBody>
+      </p:sp>
+    </p:spTree>
+    <p:extLst>
+      <p:ext uri="{BB962C8B-B14F-4D97-AF65-F5344CB8AC3E}">
+        <p14:creationId xmlns:p14="http://schemas.microsoft.com/office/powerpoint/2010/main" val="2566126866"/>
+      </p:ext>
+    </p:extLst>
+  </p:cSld>
+  <p:clrMapOvr>
+    <a:masterClrMapping/>
+  </p:clrMapOvr>
+</p:sld>
+</file>
+
+<file path=ppt/slides/slide12.xml><?xml version="1.0" encoding="utf-8"?>
+<p:sld xmlns:a="http://schemas.openxmlformats.org/drawingml/2006/main" xmlns:r="http://schemas.openxmlformats.org/officeDocument/2006/relationships" xmlns:p="http://schemas.openxmlformats.org/presentationml/2006/main">
+  <p:cSld>
+    <p:spTree>
+      <p:nvGrpSpPr>
+        <p:cNvPr id="1" name=""/>
+        <p:cNvGrpSpPr/>
+        <p:nvPr/>
+      </p:nvGrpSpPr>
+      <p:grpSpPr>
+        <a:xfrm>
+          <a:off x="0" y="0"/>
+          <a:ext cx="0" cy="0"/>
+          <a:chOff x="0" y="0"/>
+          <a:chExt cx="0" cy="0"/>
+        </a:xfrm>
+      </p:grpSpPr>
+      <p:sp>
+        <p:nvSpPr>
+          <p:cNvPr id="2" name="Nadpis 1"/>
+          <p:cNvSpPr>
+            <a:spLocks noGrp="1"/>
+          </p:cNvSpPr>
+          <p:nvPr>
+            <p:ph type="title"/>
+          </p:nvPr>
+        </p:nvSpPr>
+        <p:spPr/>
+        <p:txBody>
+          <a:bodyPr/>
+          <a:lstStyle/>
+          <a:p>
+            <a:r>
+              <a:rPr lang="cs-CZ" dirty="0"/>
+              <a:t>Děkuji za pozornost!</a:t>
+            </a:r>
+          </a:p>
+        </p:txBody>
+      </p:sp>
+      <p:sp>
+        <p:nvSpPr>
+          <p:cNvPr id="5" name="Zástupný symbol pro zápatí 3">
+            <a:extLst>
+              <a:ext uri="{FF2B5EF4-FFF2-40B4-BE49-F238E27FC236}">
+                <a16:creationId xmlns:a16="http://schemas.microsoft.com/office/drawing/2014/main" id="{3DE61977-3B64-3A40-2C61-7D194B9677EC}"/>
+              </a:ext>
+            </a:extLst>
+          </p:cNvPr>
+          <p:cNvSpPr>
+            <a:spLocks noGrp="1"/>
+          </p:cNvSpPr>
+          <p:nvPr>
+            <p:ph type="ftr" sz="quarter" idx="10"/>
+          </p:nvPr>
+        </p:nvSpPr>
+        <p:spPr>
+          <a:xfrm>
+            <a:off x="1631504" y="6518422"/>
+            <a:ext cx="10464800" cy="333375"/>
+          </a:xfrm>
+        </p:spPr>
+        <p:txBody>
+          <a:bodyPr/>
+          <a:lstStyle/>
+          <a:p>
+            <a:pPr>
+              <a:defRPr/>
+            </a:pPr>
+            <a:r>
+              <a:rPr lang="cs-CZ" dirty="0"/>
+              <a:t>11/11</a:t>
             </a:r>
           </a:p>
         </p:txBody>
@@ -6420,7 +7216,7 @@
             </a:pPr>
             <a:r>
               <a:rPr lang="cs-CZ" dirty="0"/>
-              <a:t>1/x</a:t>
+              <a:t>1/11</a:t>
             </a:r>
           </a:p>
         </p:txBody>
@@ -9223,7 +10019,7 @@
             </a:pPr>
             <a:r>
               <a:rPr lang="cs-CZ" dirty="0"/>
-              <a:t>1/x</a:t>
+              <a:t>2/11</a:t>
             </a:r>
           </a:p>
         </p:txBody>
@@ -9598,6 +10394,19 @@
             </a:r>
           </a:p>
           <a:p>
+            <a:endParaRPr lang="cs-CZ" dirty="0"/>
+          </a:p>
+          <a:p>
+            <a:r>
+              <a:rPr lang="cs-CZ" b="1" dirty="0"/>
+              <a:t>Univerzální filtr </a:t>
+            </a:r>
+            <a:r>
+              <a:rPr lang="cs-CZ" dirty="0"/>
+              <a:t>pro šumy Gauss a S&amp;P</a:t>
+            </a:r>
+          </a:p>
+          <a:p>
             <a:endParaRPr lang="cs-CZ" b="1" dirty="0"/>
           </a:p>
           <a:p>
@@ -9636,7 +10445,7 @@
             </a:pPr>
             <a:r>
               <a:rPr lang="cs-CZ" dirty="0"/>
-              <a:t>1/x</a:t>
+              <a:t>3/11</a:t>
             </a:r>
           </a:p>
         </p:txBody>
@@ -9937,7 +10746,7 @@
             </a:pPr>
             <a:r>
               <a:rPr lang="cs-CZ" dirty="0"/>
-              <a:t>1/x</a:t>
+              <a:t>4/11</a:t>
             </a:r>
           </a:p>
         </p:txBody>
@@ -10618,7 +11427,7 @@
             </a:pPr>
             <a:r>
               <a:rPr lang="cs-CZ" dirty="0"/>
-              <a:t>1/x</a:t>
+              <a:t>5/11</a:t>
             </a:r>
           </a:p>
         </p:txBody>
@@ -11328,7 +12137,7 @@
           <a:p>
             <a:r>
               <a:rPr lang="cs-CZ" dirty="0"/>
-              <a:t>Vliv pravděpodobnosti mutace a velikosti matice</a:t>
+              <a:t>Vliv velikosti matice</a:t>
             </a:r>
           </a:p>
         </p:txBody>
@@ -11364,17 +12173,17 @@
             </a:pPr>
             <a:r>
               <a:rPr lang="cs-CZ" dirty="0"/>
-              <a:t>1/x</a:t>
+              <a:t>6/11</a:t>
             </a:r>
           </a:p>
         </p:txBody>
       </p:sp>
       <p:pic>
         <p:nvPicPr>
-          <p:cNvPr id="7" name="Obrázek 6" descr="Obsah obrázku text, diagram, snímek obrazovky, Plán&#10;&#10;Popis byl vytvořen automaticky">
+          <p:cNvPr id="11" name="Obrázek 10" descr="Obsah obrázku text, diagram, snímek obrazovky, Plán&#10;&#10;Popis byl vytvořen automaticky">
             <a:extLst>
               <a:ext uri="{FF2B5EF4-FFF2-40B4-BE49-F238E27FC236}">
-                <a16:creationId xmlns:a16="http://schemas.microsoft.com/office/drawing/2014/main" id="{37485680-A238-072F-BBB0-9F262767C96A}"/>
+                <a16:creationId xmlns:a16="http://schemas.microsoft.com/office/drawing/2014/main" id="{2563D92E-F3FA-0555-36D6-7F3EF39AD8F5}"/>
               </a:ext>
             </a:extLst>
           </p:cNvPr>
@@ -11397,116 +12206,8 @@
         </p:blipFill>
         <p:spPr>
           <a:xfrm>
-            <a:off x="4943872" y="620713"/>
-            <a:ext cx="4649707" cy="5040535"/>
-          </a:xfrm>
-          <a:prstGeom prst="rect">
-            <a:avLst/>
-          </a:prstGeom>
-        </p:spPr>
-      </p:pic>
-      <p:pic>
-        <p:nvPicPr>
-          <p:cNvPr id="11" name="Obrázek 10" descr="Obsah obrázku text, diagram, snímek obrazovky, Plán&#10;&#10;Popis byl vytvořen automaticky">
-            <a:extLst>
-              <a:ext uri="{FF2B5EF4-FFF2-40B4-BE49-F238E27FC236}">
-                <a16:creationId xmlns:a16="http://schemas.microsoft.com/office/drawing/2014/main" id="{2563D92E-F3FA-0555-36D6-7F3EF39AD8F5}"/>
-              </a:ext>
-            </a:extLst>
-          </p:cNvPr>
-          <p:cNvPicPr>
-            <a:picLocks noChangeAspect="1"/>
-          </p:cNvPicPr>
-          <p:nvPr/>
-        </p:nvPicPr>
-        <p:blipFill>
-          <a:blip r:embed="rId4">
-            <a:extLst>
-              <a:ext uri="{28A0092B-C50C-407E-A947-70E740481C1C}">
-                <a14:useLocalDpi xmlns:a14="http://schemas.microsoft.com/office/drawing/2010/main" val="0"/>
-              </a:ext>
-            </a:extLst>
-          </a:blip>
-          <a:stretch>
-            <a:fillRect/>
-          </a:stretch>
-        </p:blipFill>
-        <p:spPr>
-          <a:xfrm>
-            <a:off x="111117" y="694673"/>
+            <a:off x="622749" y="942834"/>
             <a:ext cx="4616731" cy="4125953"/>
-          </a:xfrm>
-          <a:prstGeom prst="rect">
-            <a:avLst/>
-          </a:prstGeom>
-        </p:spPr>
-      </p:pic>
-      <p:pic>
-        <p:nvPicPr>
-          <p:cNvPr id="13" name="Obrázek 12" descr="Obsah obrázku text, snímek obrazovky, řada/pruh, diagram&#10;&#10;Popis byl vytvořen automaticky">
-            <a:extLst>
-              <a:ext uri="{FF2B5EF4-FFF2-40B4-BE49-F238E27FC236}">
-                <a16:creationId xmlns:a16="http://schemas.microsoft.com/office/drawing/2014/main" id="{0CF44DDD-B2C6-3959-5424-77E12F541DA3}"/>
-              </a:ext>
-            </a:extLst>
-          </p:cNvPr>
-          <p:cNvPicPr>
-            <a:picLocks noChangeAspect="1"/>
-          </p:cNvPicPr>
-          <p:nvPr/>
-        </p:nvPicPr>
-        <p:blipFill>
-          <a:blip r:embed="rId5">
-            <a:extLst>
-              <a:ext uri="{28A0092B-C50C-407E-A947-70E740481C1C}">
-                <a14:useLocalDpi xmlns:a14="http://schemas.microsoft.com/office/drawing/2010/main" val="0"/>
-              </a:ext>
-            </a:extLst>
-          </a:blip>
-          <a:stretch>
-            <a:fillRect/>
-          </a:stretch>
-        </p:blipFill>
-        <p:spPr>
-          <a:xfrm>
-            <a:off x="9237097" y="3365426"/>
-            <a:ext cx="2921074" cy="2112307"/>
-          </a:xfrm>
-          <a:prstGeom prst="rect">
-            <a:avLst/>
-          </a:prstGeom>
-        </p:spPr>
-      </p:pic>
-      <p:pic>
-        <p:nvPicPr>
-          <p:cNvPr id="15" name="Obrázek 14" descr="Obsah obrázku text, snímek obrazovky, řada/pruh, diagram&#10;&#10;Popis byl vytvořen automaticky">
-            <a:extLst>
-              <a:ext uri="{FF2B5EF4-FFF2-40B4-BE49-F238E27FC236}">
-                <a16:creationId xmlns:a16="http://schemas.microsoft.com/office/drawing/2014/main" id="{5A443AA1-B706-7213-60E6-4639688AA335}"/>
-              </a:ext>
-            </a:extLst>
-          </p:cNvPr>
-          <p:cNvPicPr>
-            <a:picLocks noChangeAspect="1"/>
-          </p:cNvPicPr>
-          <p:nvPr/>
-        </p:nvPicPr>
-        <p:blipFill>
-          <a:blip r:embed="rId6">
-            <a:extLst>
-              <a:ext uri="{28A0092B-C50C-407E-A947-70E740481C1C}">
-                <a14:useLocalDpi xmlns:a14="http://schemas.microsoft.com/office/drawing/2010/main" val="0"/>
-              </a:ext>
-            </a:extLst>
-          </a:blip>
-          <a:stretch>
-            <a:fillRect/>
-          </a:stretch>
-        </p:blipFill>
-        <p:spPr>
-          <a:xfrm>
-            <a:off x="9270390" y="1068993"/>
-            <a:ext cx="2854487" cy="2064156"/>
           </a:xfrm>
           <a:prstGeom prst="rect">
             <a:avLst/>
@@ -11527,7 +12228,7 @@
         </p:nvGrpSpPr>
         <p:grpSpPr>
           <a:xfrm>
-            <a:off x="1056649" y="5298571"/>
+            <a:off x="1332566" y="5301082"/>
             <a:ext cx="2645261" cy="894078"/>
             <a:chOff x="999871" y="5185960"/>
             <a:chExt cx="2645261" cy="894078"/>
@@ -11548,10 +12249,10 @@
             <p:nvPr/>
           </p:nvPicPr>
           <p:blipFill>
-            <a:blip r:embed="rId7">
+            <a:blip r:embed="rId4">
               <a:extLst>
                 <a:ext uri="{96DAC541-7B7A-43D3-8B79-37D633B846F1}">
-                  <asvg:svgBlip xmlns:asvg="http://schemas.microsoft.com/office/drawing/2016/SVG/main" r:embed="rId8"/>
+                  <asvg:svgBlip xmlns:asvg="http://schemas.microsoft.com/office/drawing/2016/SVG/main" r:embed="rId5"/>
                 </a:ext>
               </a:extLst>
             </a:blip>
@@ -11734,6 +12435,487 @@
           </p:txBody>
         </p:sp>
       </p:grpSp>
+      <p:sp>
+        <p:nvSpPr>
+          <p:cNvPr id="30" name="TextovéPole 29">
+            <a:extLst>
+              <a:ext uri="{FF2B5EF4-FFF2-40B4-BE49-F238E27FC236}">
+                <a16:creationId xmlns:a16="http://schemas.microsoft.com/office/drawing/2014/main" id="{4C1F9810-8A2E-7A25-AD4F-28C36DE5D599}"/>
+              </a:ext>
+            </a:extLst>
+          </p:cNvPr>
+          <p:cNvSpPr txBox="1"/>
+          <p:nvPr/>
+        </p:nvSpPr>
+        <p:spPr>
+          <a:xfrm>
+            <a:off x="6304412" y="942834"/>
+            <a:ext cx="5264839" cy="972574"/>
+          </a:xfrm>
+          <a:prstGeom prst="rect">
+            <a:avLst/>
+          </a:prstGeom>
+          <a:noFill/>
+        </p:spPr>
+        <p:txBody>
+          <a:bodyPr wrap="none" rtlCol="0">
+            <a:spAutoFit/>
+          </a:bodyPr>
+          <a:lstStyle/>
+          <a:p>
+            <a:pPr algn="l">
+              <a:buNone/>
+            </a:pPr>
+            <a:r>
+              <a:rPr lang="cs-CZ" sz="2600" b="0" dirty="0">
+                <a:solidFill>
+                  <a:schemeClr val="tx1"/>
+                </a:solidFill>
+                <a:latin typeface="Calibri" panose="020F0502020204030204" pitchFamily="34" charset="0"/>
+                <a:ea typeface="Calibri" panose="020F0502020204030204" pitchFamily="34" charset="0"/>
+                <a:cs typeface="Calibri" panose="020F0502020204030204" pitchFamily="34" charset="0"/>
+              </a:rPr>
+              <a:t>Je rozdíl u Gauss mezi 2x10 a 5x5, 9x6</a:t>
+            </a:r>
+          </a:p>
+          <a:p>
+            <a:pPr algn="l">
+              <a:buNone/>
+            </a:pPr>
+            <a:r>
+              <a:rPr lang="cs-CZ" sz="2600" b="0" dirty="0">
+                <a:solidFill>
+                  <a:schemeClr val="tx1"/>
+                </a:solidFill>
+                <a:latin typeface="Calibri" panose="020F0502020204030204" pitchFamily="34" charset="0"/>
+                <a:ea typeface="Calibri" panose="020F0502020204030204" pitchFamily="34" charset="0"/>
+                <a:cs typeface="Calibri" panose="020F0502020204030204" pitchFamily="34" charset="0"/>
+              </a:rPr>
+              <a:t>významný?</a:t>
+            </a:r>
+          </a:p>
+        </p:txBody>
+      </p:sp>
+      <p:sp>
+        <p:nvSpPr>
+          <p:cNvPr id="33" name="TextovéPole 32">
+            <a:extLst>
+              <a:ext uri="{FF2B5EF4-FFF2-40B4-BE49-F238E27FC236}">
+                <a16:creationId xmlns:a16="http://schemas.microsoft.com/office/drawing/2014/main" id="{46D182E8-A365-FFF5-6BBA-6B490DD670D0}"/>
+              </a:ext>
+            </a:extLst>
+          </p:cNvPr>
+          <p:cNvSpPr txBox="1"/>
+          <p:nvPr/>
+        </p:nvSpPr>
+        <p:spPr>
+          <a:xfrm>
+            <a:off x="6304412" y="2639862"/>
+            <a:ext cx="1186800" cy="492443"/>
+          </a:xfrm>
+          <a:prstGeom prst="rect">
+            <a:avLst/>
+          </a:prstGeom>
+          <a:noFill/>
+        </p:spPr>
+        <p:txBody>
+          <a:bodyPr wrap="none" rtlCol="0">
+            <a:spAutoFit/>
+          </a:bodyPr>
+          <a:lstStyle/>
+          <a:p>
+            <a:pPr algn="l">
+              <a:buNone/>
+            </a:pPr>
+            <a:r>
+              <a:rPr lang="cs-CZ" sz="2600" b="0" dirty="0">
+                <a:solidFill>
+                  <a:schemeClr val="tx1"/>
+                </a:solidFill>
+                <a:latin typeface="Cambria Math" panose="02040503050406030204" pitchFamily="18" charset="0"/>
+                <a:ea typeface="Cambria Math" panose="02040503050406030204" pitchFamily="18" charset="0"/>
+                <a:cs typeface="Calibri" panose="020F0502020204030204" pitchFamily="34" charset="0"/>
+              </a:rPr>
+              <a:t>U-Test:</a:t>
+            </a:r>
+          </a:p>
+        </p:txBody>
+      </p:sp>
+      <p:cxnSp>
+        <p:nvCxnSpPr>
+          <p:cNvPr id="39" name="Přímá spojnice 38">
+            <a:extLst>
+              <a:ext uri="{FF2B5EF4-FFF2-40B4-BE49-F238E27FC236}">
+                <a16:creationId xmlns:a16="http://schemas.microsoft.com/office/drawing/2014/main" id="{24DE32C1-F1D8-DE81-3408-8BA699BF897E}"/>
+              </a:ext>
+            </a:extLst>
+          </p:cNvPr>
+          <p:cNvCxnSpPr/>
+          <p:nvPr/>
+        </p:nvCxnSpPr>
+        <p:spPr bwMode="auto">
+          <a:xfrm>
+            <a:off x="8184232" y="3237224"/>
+            <a:ext cx="0" cy="1535680"/>
+          </a:xfrm>
+          <a:prstGeom prst="line">
+            <a:avLst/>
+          </a:prstGeom>
+          <a:noFill/>
+          <a:ln w="38100" cap="flat" cmpd="sng" algn="ctr">
+            <a:solidFill>
+              <a:schemeClr val="accent6">
+                <a:lumMod val="75000"/>
+              </a:schemeClr>
+            </a:solidFill>
+            <a:prstDash val="solid"/>
+            <a:round/>
+            <a:headEnd type="none" w="med" len="med"/>
+            <a:tailEnd type="none" w="med" len="med"/>
+          </a:ln>
+          <a:effectLst/>
+        </p:spPr>
+      </p:cxnSp>
+      <p:cxnSp>
+        <p:nvCxnSpPr>
+          <p:cNvPr id="41" name="Přímá spojnice 40">
+            <a:extLst>
+              <a:ext uri="{FF2B5EF4-FFF2-40B4-BE49-F238E27FC236}">
+                <a16:creationId xmlns:a16="http://schemas.microsoft.com/office/drawing/2014/main" id="{39D07865-3ECF-2AB2-9E21-8A225B741FBB}"/>
+              </a:ext>
+            </a:extLst>
+          </p:cNvPr>
+          <p:cNvCxnSpPr/>
+          <p:nvPr/>
+        </p:nvCxnSpPr>
+        <p:spPr bwMode="auto">
+          <a:xfrm>
+            <a:off x="6384032" y="4005064"/>
+            <a:ext cx="5256584" cy="0"/>
+          </a:xfrm>
+          <a:prstGeom prst="line">
+            <a:avLst/>
+          </a:prstGeom>
+          <a:noFill/>
+          <a:ln w="38100" cap="flat" cmpd="sng" algn="ctr">
+            <a:solidFill>
+              <a:schemeClr val="accent6">
+                <a:lumMod val="75000"/>
+              </a:schemeClr>
+            </a:solidFill>
+            <a:prstDash val="solid"/>
+            <a:round/>
+            <a:headEnd type="none" w="med" len="med"/>
+            <a:tailEnd type="none" w="med" len="med"/>
+          </a:ln>
+          <a:effectLst/>
+        </p:spPr>
+      </p:cxnSp>
+      <p:cxnSp>
+        <p:nvCxnSpPr>
+          <p:cNvPr id="42" name="Přímá spojnice 41">
+            <a:extLst>
+              <a:ext uri="{FF2B5EF4-FFF2-40B4-BE49-F238E27FC236}">
+                <a16:creationId xmlns:a16="http://schemas.microsoft.com/office/drawing/2014/main" id="{BC492DD2-F290-398B-0948-EA59BEF13D20}"/>
+              </a:ext>
+            </a:extLst>
+          </p:cNvPr>
+          <p:cNvCxnSpPr/>
+          <p:nvPr/>
+        </p:nvCxnSpPr>
+        <p:spPr bwMode="auto">
+          <a:xfrm>
+            <a:off x="9984432" y="3237224"/>
+            <a:ext cx="0" cy="1535680"/>
+          </a:xfrm>
+          <a:prstGeom prst="line">
+            <a:avLst/>
+          </a:prstGeom>
+          <a:noFill/>
+          <a:ln w="38100" cap="flat" cmpd="sng" algn="ctr">
+            <a:solidFill>
+              <a:schemeClr val="accent6">
+                <a:lumMod val="75000"/>
+              </a:schemeClr>
+            </a:solidFill>
+            <a:prstDash val="solid"/>
+            <a:round/>
+            <a:headEnd type="none" w="med" len="med"/>
+            <a:tailEnd type="none" w="med" len="med"/>
+          </a:ln>
+          <a:effectLst/>
+        </p:spPr>
+      </p:cxnSp>
+      <p:sp>
+        <p:nvSpPr>
+          <p:cNvPr id="43" name="TextovéPole 42">
+            <a:extLst>
+              <a:ext uri="{FF2B5EF4-FFF2-40B4-BE49-F238E27FC236}">
+                <a16:creationId xmlns:a16="http://schemas.microsoft.com/office/drawing/2014/main" id="{EACC649C-0F77-CE53-F8AC-0F82264E3896}"/>
+              </a:ext>
+            </a:extLst>
+          </p:cNvPr>
+          <p:cNvSpPr txBox="1"/>
+          <p:nvPr/>
+        </p:nvSpPr>
+        <p:spPr>
+          <a:xfrm>
+            <a:off x="6747111" y="4191094"/>
+            <a:ext cx="899605" cy="492443"/>
+          </a:xfrm>
+          <a:prstGeom prst="rect">
+            <a:avLst/>
+          </a:prstGeom>
+          <a:noFill/>
+        </p:spPr>
+        <p:txBody>
+          <a:bodyPr wrap="none" rtlCol="0">
+            <a:spAutoFit/>
+          </a:bodyPr>
+          <a:lstStyle/>
+          <a:p>
+            <a:pPr algn="l">
+              <a:buNone/>
+            </a:pPr>
+            <a:r>
+              <a:rPr lang="cs-CZ" sz="2600" b="0" dirty="0">
+                <a:solidFill>
+                  <a:schemeClr val="tx1"/>
+                </a:solidFill>
+                <a:latin typeface="Cambria Math" panose="02040503050406030204" pitchFamily="18" charset="0"/>
+                <a:ea typeface="Cambria Math" panose="02040503050406030204" pitchFamily="18" charset="0"/>
+                <a:cs typeface="Calibri" panose="020F0502020204030204" pitchFamily="34" charset="0"/>
+              </a:rPr>
+              <a:t>2x10</a:t>
+            </a:r>
+          </a:p>
+        </p:txBody>
+      </p:sp>
+      <p:sp>
+        <p:nvSpPr>
+          <p:cNvPr id="44" name="TextovéPole 43">
+            <a:extLst>
+              <a:ext uri="{FF2B5EF4-FFF2-40B4-BE49-F238E27FC236}">
+                <a16:creationId xmlns:a16="http://schemas.microsoft.com/office/drawing/2014/main" id="{30D743C7-9E7E-D58B-DE39-78E0C13F75D0}"/>
+              </a:ext>
+            </a:extLst>
+          </p:cNvPr>
+          <p:cNvSpPr txBox="1"/>
+          <p:nvPr/>
+        </p:nvSpPr>
+        <p:spPr>
+          <a:xfrm>
+            <a:off x="8721749" y="3333551"/>
+            <a:ext cx="715260" cy="492443"/>
+          </a:xfrm>
+          <a:prstGeom prst="rect">
+            <a:avLst/>
+          </a:prstGeom>
+          <a:noFill/>
+        </p:spPr>
+        <p:txBody>
+          <a:bodyPr wrap="none" rtlCol="0">
+            <a:spAutoFit/>
+          </a:bodyPr>
+          <a:lstStyle/>
+          <a:p>
+            <a:pPr algn="l">
+              <a:buNone/>
+            </a:pPr>
+            <a:r>
+              <a:rPr lang="cs-CZ" sz="2600" b="0" dirty="0">
+                <a:solidFill>
+                  <a:schemeClr val="tx1"/>
+                </a:solidFill>
+                <a:latin typeface="Cambria Math" panose="02040503050406030204" pitchFamily="18" charset="0"/>
+                <a:ea typeface="Cambria Math" panose="02040503050406030204" pitchFamily="18" charset="0"/>
+                <a:cs typeface="Calibri" panose="020F0502020204030204" pitchFamily="34" charset="0"/>
+              </a:rPr>
+              <a:t>5x5</a:t>
+            </a:r>
+          </a:p>
+        </p:txBody>
+      </p:sp>
+      <p:sp>
+        <p:nvSpPr>
+          <p:cNvPr id="45" name="TextovéPole 44">
+            <a:extLst>
+              <a:ext uri="{FF2B5EF4-FFF2-40B4-BE49-F238E27FC236}">
+                <a16:creationId xmlns:a16="http://schemas.microsoft.com/office/drawing/2014/main" id="{EC3BDDF0-285C-873F-8145-842E41EF4317}"/>
+              </a:ext>
+            </a:extLst>
+          </p:cNvPr>
+          <p:cNvSpPr txBox="1"/>
+          <p:nvPr/>
+        </p:nvSpPr>
+        <p:spPr>
+          <a:xfrm>
+            <a:off x="10430969" y="3317773"/>
+            <a:ext cx="715260" cy="492443"/>
+          </a:xfrm>
+          <a:prstGeom prst="rect">
+            <a:avLst/>
+          </a:prstGeom>
+          <a:noFill/>
+        </p:spPr>
+        <p:txBody>
+          <a:bodyPr wrap="none" rtlCol="0">
+            <a:spAutoFit/>
+          </a:bodyPr>
+          <a:lstStyle/>
+          <a:p>
+            <a:pPr algn="l">
+              <a:buNone/>
+            </a:pPr>
+            <a:r>
+              <a:rPr lang="cs-CZ" sz="2600" b="0" dirty="0">
+                <a:solidFill>
+                  <a:schemeClr val="tx1"/>
+                </a:solidFill>
+                <a:latin typeface="Cambria Math" panose="02040503050406030204" pitchFamily="18" charset="0"/>
+                <a:ea typeface="Cambria Math" panose="02040503050406030204" pitchFamily="18" charset="0"/>
+                <a:cs typeface="Calibri" panose="020F0502020204030204" pitchFamily="34" charset="0"/>
+              </a:rPr>
+              <a:t>9x6</a:t>
+            </a:r>
+          </a:p>
+        </p:txBody>
+      </p:sp>
+      <p:sp>
+        <p:nvSpPr>
+          <p:cNvPr id="46" name="TextovéPole 45">
+            <a:extLst>
+              <a:ext uri="{FF2B5EF4-FFF2-40B4-BE49-F238E27FC236}">
+                <a16:creationId xmlns:a16="http://schemas.microsoft.com/office/drawing/2014/main" id="{2C034CD1-C446-14DE-8F32-4CA50BCB6374}"/>
+              </a:ext>
+            </a:extLst>
+          </p:cNvPr>
+          <p:cNvSpPr txBox="1"/>
+          <p:nvPr/>
+        </p:nvSpPr>
+        <p:spPr>
+          <a:xfrm>
+            <a:off x="8535399" y="4191093"/>
+            <a:ext cx="1175322" cy="492443"/>
+          </a:xfrm>
+          <a:prstGeom prst="rect">
+            <a:avLst/>
+          </a:prstGeom>
+          <a:noFill/>
+        </p:spPr>
+        <p:txBody>
+          <a:bodyPr wrap="none" rtlCol="0">
+            <a:spAutoFit/>
+          </a:bodyPr>
+          <a:lstStyle/>
+          <a:p>
+            <a:pPr algn="l">
+              <a:buNone/>
+            </a:pPr>
+            <a:r>
+              <a:rPr lang="cs-CZ" sz="2600" b="0" dirty="0">
+                <a:solidFill>
+                  <a:schemeClr val="tx1"/>
+                </a:solidFill>
+                <a:latin typeface="Cambria Math" panose="02040503050406030204" pitchFamily="18" charset="0"/>
+                <a:ea typeface="Cambria Math" panose="02040503050406030204" pitchFamily="18" charset="0"/>
+                <a:cs typeface="Calibri" panose="020F0502020204030204" pitchFamily="34" charset="0"/>
+              </a:rPr>
+              <a:t>0.2062</a:t>
+            </a:r>
+          </a:p>
+        </p:txBody>
+      </p:sp>
+      <p:sp>
+        <p:nvSpPr>
+          <p:cNvPr id="47" name="TextovéPole 46">
+            <a:extLst>
+              <a:ext uri="{FF2B5EF4-FFF2-40B4-BE49-F238E27FC236}">
+                <a16:creationId xmlns:a16="http://schemas.microsoft.com/office/drawing/2014/main" id="{A12D02A3-D85F-9593-0C5C-04CFB15882D2}"/>
+              </a:ext>
+            </a:extLst>
+          </p:cNvPr>
+          <p:cNvSpPr txBox="1"/>
+          <p:nvPr/>
+        </p:nvSpPr>
+        <p:spPr>
+          <a:xfrm>
+            <a:off x="10271454" y="4200006"/>
+            <a:ext cx="1175322" cy="492443"/>
+          </a:xfrm>
+          <a:prstGeom prst="rect">
+            <a:avLst/>
+          </a:prstGeom>
+          <a:noFill/>
+        </p:spPr>
+        <p:txBody>
+          <a:bodyPr wrap="none" rtlCol="0">
+            <a:spAutoFit/>
+          </a:bodyPr>
+          <a:lstStyle/>
+          <a:p>
+            <a:pPr algn="l">
+              <a:buNone/>
+            </a:pPr>
+            <a:r>
+              <a:rPr lang="cs-CZ" sz="2600" b="0" dirty="0">
+                <a:solidFill>
+                  <a:schemeClr val="tx1"/>
+                </a:solidFill>
+                <a:latin typeface="Cambria Math" panose="02040503050406030204" pitchFamily="18" charset="0"/>
+                <a:ea typeface="Cambria Math" panose="02040503050406030204" pitchFamily="18" charset="0"/>
+                <a:cs typeface="Calibri" panose="020F0502020204030204" pitchFamily="34" charset="0"/>
+              </a:rPr>
+              <a:t>0.5201</a:t>
+            </a:r>
+          </a:p>
+        </p:txBody>
+      </p:sp>
+      <p:sp>
+        <p:nvSpPr>
+          <p:cNvPr id="49" name="TextovéPole 48">
+            <a:extLst>
+              <a:ext uri="{FF2B5EF4-FFF2-40B4-BE49-F238E27FC236}">
+                <a16:creationId xmlns:a16="http://schemas.microsoft.com/office/drawing/2014/main" id="{5599EA62-1F53-6F10-0AB5-B0F4D73D89FB}"/>
+              </a:ext>
+            </a:extLst>
+          </p:cNvPr>
+          <p:cNvSpPr txBox="1"/>
+          <p:nvPr/>
+        </p:nvSpPr>
+        <p:spPr>
+          <a:xfrm>
+            <a:off x="9437009" y="4982137"/>
+            <a:ext cx="1128835" cy="492443"/>
+          </a:xfrm>
+          <a:prstGeom prst="rect">
+            <a:avLst/>
+          </a:prstGeom>
+          <a:noFill/>
+        </p:spPr>
+        <p:txBody>
+          <a:bodyPr wrap="none" rtlCol="0">
+            <a:spAutoFit/>
+          </a:bodyPr>
+          <a:lstStyle/>
+          <a:p>
+            <a:pPr algn="l">
+              <a:buNone/>
+            </a:pPr>
+            <a:r>
+              <a:rPr lang="cs-CZ" sz="2600" b="0" dirty="0">
+                <a:solidFill>
+                  <a:schemeClr val="tx1"/>
+                </a:solidFill>
+                <a:latin typeface="+mn-lt"/>
+                <a:ea typeface="Cambria Math" panose="02040503050406030204" pitchFamily="18" charset="0"/>
+                <a:cs typeface="Calibri" panose="020F0502020204030204" pitchFamily="34" charset="0"/>
+              </a:rPr>
+              <a:t>(Není)</a:t>
+            </a:r>
+          </a:p>
+        </p:txBody>
+      </p:sp>
     </p:spTree>
     <p:extLst>
       <p:ext uri="{BB962C8B-B14F-4D97-AF65-F5344CB8AC3E}">
@@ -11781,7 +12963,7 @@
           <a:p>
             <a:r>
               <a:rPr lang="cs-CZ" dirty="0"/>
-              <a:t>Děkuji za pozornost!</a:t>
+              <a:t>Vliv pravděpodobnosti mutace</a:t>
             </a:r>
           </a:p>
         </p:txBody>
@@ -11817,7 +12999,180 @@
             </a:pPr>
             <a:r>
               <a:rPr lang="cs-CZ" dirty="0"/>
-              <a:t>1/x</a:t>
+              <a:t>7/11</a:t>
+            </a:r>
+          </a:p>
+        </p:txBody>
+      </p:sp>
+      <p:pic>
+        <p:nvPicPr>
+          <p:cNvPr id="3" name="Obrázek 2" descr="Obsah obrázku text, diagram, snímek obrazovky, Plán&#10;&#10;Popis byl vytvořen automaticky">
+            <a:extLst>
+              <a:ext uri="{FF2B5EF4-FFF2-40B4-BE49-F238E27FC236}">
+                <a16:creationId xmlns:a16="http://schemas.microsoft.com/office/drawing/2014/main" id="{C9B3C33C-9998-502E-2E60-9D099B899473}"/>
+              </a:ext>
+            </a:extLst>
+          </p:cNvPr>
+          <p:cNvPicPr>
+            <a:picLocks noChangeAspect="1"/>
+          </p:cNvPicPr>
+          <p:nvPr/>
+        </p:nvPicPr>
+        <p:blipFill>
+          <a:blip r:embed="rId3">
+            <a:extLst>
+              <a:ext uri="{28A0092B-C50C-407E-A947-70E740481C1C}">
+                <a14:useLocalDpi xmlns:a14="http://schemas.microsoft.com/office/drawing/2010/main" val="0"/>
+              </a:ext>
+            </a:extLst>
+          </a:blip>
+          <a:stretch>
+            <a:fillRect/>
+          </a:stretch>
+        </p:blipFill>
+        <p:spPr>
+          <a:xfrm>
+            <a:off x="285001" y="836712"/>
+            <a:ext cx="4874895" cy="5284651"/>
+          </a:xfrm>
+          <a:prstGeom prst="rect">
+            <a:avLst/>
+          </a:prstGeom>
+        </p:spPr>
+      </p:pic>
+      <p:pic>
+        <p:nvPicPr>
+          <p:cNvPr id="4" name="Obrázek 3" descr="Obsah obrázku text, snímek obrazovky, řada/pruh, diagram&#10;&#10;Popis byl vytvořen automaticky">
+            <a:extLst>
+              <a:ext uri="{FF2B5EF4-FFF2-40B4-BE49-F238E27FC236}">
+                <a16:creationId xmlns:a16="http://schemas.microsoft.com/office/drawing/2014/main" id="{93B8AE6C-EE5A-3D41-8992-461B946E4B7A}"/>
+              </a:ext>
+            </a:extLst>
+          </p:cNvPr>
+          <p:cNvPicPr>
+            <a:picLocks noChangeAspect="1"/>
+          </p:cNvPicPr>
+          <p:nvPr/>
+        </p:nvPicPr>
+        <p:blipFill>
+          <a:blip r:embed="rId4">
+            <a:extLst>
+              <a:ext uri="{28A0092B-C50C-407E-A947-70E740481C1C}">
+                <a14:useLocalDpi xmlns:a14="http://schemas.microsoft.com/office/drawing/2010/main" val="0"/>
+              </a:ext>
+            </a:extLst>
+          </a:blip>
+          <a:stretch>
+            <a:fillRect/>
+          </a:stretch>
+        </p:blipFill>
+        <p:spPr>
+          <a:xfrm>
+            <a:off x="5159896" y="1280161"/>
+            <a:ext cx="3305380" cy="2390209"/>
+          </a:xfrm>
+          <a:prstGeom prst="rect">
+            <a:avLst/>
+          </a:prstGeom>
+        </p:spPr>
+      </p:pic>
+      <p:pic>
+        <p:nvPicPr>
+          <p:cNvPr id="6" name="Obrázek 5" descr="Obsah obrázku text, snímek obrazovky, řada/pruh, diagram&#10;&#10;Popis byl vytvořen automaticky">
+            <a:extLst>
+              <a:ext uri="{FF2B5EF4-FFF2-40B4-BE49-F238E27FC236}">
+                <a16:creationId xmlns:a16="http://schemas.microsoft.com/office/drawing/2014/main" id="{33984D2E-D1EB-B684-DC6B-06E9DA7E06AC}"/>
+              </a:ext>
+            </a:extLst>
+          </p:cNvPr>
+          <p:cNvPicPr>
+            <a:picLocks noChangeAspect="1"/>
+          </p:cNvPicPr>
+          <p:nvPr/>
+        </p:nvPicPr>
+        <p:blipFill>
+          <a:blip r:embed="rId5">
+            <a:extLst>
+              <a:ext uri="{28A0092B-C50C-407E-A947-70E740481C1C}">
+                <a14:useLocalDpi xmlns:a14="http://schemas.microsoft.com/office/drawing/2010/main" val="0"/>
+              </a:ext>
+            </a:extLst>
+          </a:blip>
+          <a:stretch>
+            <a:fillRect/>
+          </a:stretch>
+        </p:blipFill>
+        <p:spPr>
+          <a:xfrm>
+            <a:off x="8544272" y="1280161"/>
+            <a:ext cx="3305381" cy="2390210"/>
+          </a:xfrm>
+          <a:prstGeom prst="rect">
+            <a:avLst/>
+          </a:prstGeom>
+        </p:spPr>
+      </p:pic>
+      <p:sp>
+        <p:nvSpPr>
+          <p:cNvPr id="7" name="TextovéPole 6">
+            <a:extLst>
+              <a:ext uri="{FF2B5EF4-FFF2-40B4-BE49-F238E27FC236}">
+                <a16:creationId xmlns:a16="http://schemas.microsoft.com/office/drawing/2014/main" id="{665C605C-EFBB-BF75-0501-ECAC671780E0}"/>
+              </a:ext>
+            </a:extLst>
+          </p:cNvPr>
+          <p:cNvSpPr txBox="1"/>
+          <p:nvPr/>
+        </p:nvSpPr>
+        <p:spPr>
+          <a:xfrm>
+            <a:off x="5591944" y="4505063"/>
+            <a:ext cx="5847664" cy="1292662"/>
+          </a:xfrm>
+          <a:prstGeom prst="rect">
+            <a:avLst/>
+          </a:prstGeom>
+          <a:noFill/>
+        </p:spPr>
+        <p:txBody>
+          <a:bodyPr wrap="square" rtlCol="0">
+            <a:spAutoFit/>
+          </a:bodyPr>
+          <a:lstStyle/>
+          <a:p>
+            <a:pPr marL="457200" indent="-457200"/>
+            <a:r>
+              <a:rPr lang="cs-CZ" sz="2600" b="0" dirty="0">
+                <a:solidFill>
+                  <a:schemeClr val="tx1"/>
+                </a:solidFill>
+                <a:latin typeface="Calibri" panose="020F0502020204030204" pitchFamily="34" charset="0"/>
+                <a:ea typeface="Calibri" panose="020F0502020204030204" pitchFamily="34" charset="0"/>
+                <a:cs typeface="Calibri" panose="020F0502020204030204" pitchFamily="34" charset="0"/>
+              </a:rPr>
+              <a:t>Významnost rozdílů u Gauss. a S&amp;P se </a:t>
+            </a:r>
+            <a:r>
+              <a:rPr lang="cs-CZ" sz="2600" dirty="0">
+                <a:solidFill>
+                  <a:schemeClr val="tx1"/>
+                </a:solidFill>
+                <a:latin typeface="Calibri" panose="020F0502020204030204" pitchFamily="34" charset="0"/>
+                <a:ea typeface="Calibri" panose="020F0502020204030204" pitchFamily="34" charset="0"/>
+                <a:cs typeface="Calibri" panose="020F0502020204030204" pitchFamily="34" charset="0"/>
+              </a:rPr>
+              <a:t>nepodařilo ověřit</a:t>
+            </a:r>
+            <a:r>
+              <a:rPr lang="cs-CZ" sz="2600" b="0" dirty="0">
+                <a:solidFill>
+                  <a:schemeClr val="tx1"/>
+                </a:solidFill>
+                <a:latin typeface="Calibri" panose="020F0502020204030204" pitchFamily="34" charset="0"/>
+                <a:ea typeface="Calibri" panose="020F0502020204030204" pitchFamily="34" charset="0"/>
+                <a:cs typeface="Calibri" panose="020F0502020204030204" pitchFamily="34" charset="0"/>
+              </a:rPr>
+              <a:t> statistickými testy (normalita, duplikované hodnoty)</a:t>
             </a:r>
           </a:p>
         </p:txBody>
@@ -11905,7 +13260,7 @@
             </a:pPr>
             <a:r>
               <a:rPr lang="cs-CZ" dirty="0"/>
-              <a:t>1/x</a:t>
+              <a:t>8/11</a:t>
             </a:r>
           </a:p>
         </p:txBody>

</xml_diff>